<commit_message>
related Fleet & Terraform
</commit_message>
<xml_diff>
--- a/figures.pptx
+++ b/figures.pptx
@@ -5,7 +5,7 @@
     <p:sldMasterId id="2147483648" r:id="rId1"/>
   </p:sldMasterIdLst>
   <p:notesMasterIdLst>
-    <p:notesMasterId r:id="rId23"/>
+    <p:notesMasterId r:id="rId24"/>
   </p:notesMasterIdLst>
   <p:sldIdLst>
     <p:sldId id="311" r:id="rId2"/>
@@ -29,6 +29,7 @@
     <p:sldId id="346" r:id="rId20"/>
     <p:sldId id="347" r:id="rId21"/>
     <p:sldId id="348" r:id="rId22"/>
+    <p:sldId id="349" r:id="rId23"/>
   </p:sldIdLst>
   <p:sldSz cx="9144000" cy="5143500" type="screen16x9"/>
   <p:notesSz cx="6858000" cy="9144000"/>
@@ -317,7 +318,7 @@
       </p15:sldGuideLst>
     </p:ext>
     <p:ext uri="http://customooxmlschemas.google.com/">
-      <go:slidesCustomData xmlns="" xmlns:mc="http://schemas.openxmlformats.org/markup-compatibility/2006" xmlns:mv="urn:schemas-microsoft-com:mac:vml" xmlns:c="http://schemas.openxmlformats.org/drawingml/2006/chart" xmlns:dgm="http://schemas.openxmlformats.org/drawingml/2006/diagram" xmlns:o="urn:schemas-microsoft-com:office:office" xmlns:v="urn:schemas-microsoft-com:vml" xmlns:pvml="urn:schemas-microsoft-com:office:powerpoint" xmlns:com="http://schemas.openxmlformats.org/drawingml/2006/compatibility" xmlns:p14="http://schemas.microsoft.com/office/powerpoint/2010/main" xmlns:p15="http://schemas.microsoft.com/office/powerpoint/2012/main" xmlns:go="http://customooxmlschemas.google.com/" r:id="rId29" roundtripDataSignature="AMtx7mjYSJr9dBhpBi3R8tFsPF3I3gzuVA=="/>
+      <go:slidesCustomData xmlns:go="http://customooxmlschemas.google.com/" xmlns:p15="http://schemas.microsoft.com/office/powerpoint/2012/main" xmlns:p14="http://schemas.microsoft.com/office/powerpoint/2010/main" xmlns:com="http://schemas.openxmlformats.org/drawingml/2006/compatibility" xmlns:pvml="urn:schemas-microsoft-com:office:powerpoint" xmlns:v="urn:schemas-microsoft-com:vml" xmlns:o="urn:schemas-microsoft-com:office:office" xmlns:dgm="http://schemas.openxmlformats.org/drawingml/2006/diagram" xmlns:c="http://schemas.openxmlformats.org/drawingml/2006/chart" xmlns:mv="urn:schemas-microsoft-com:mac:vml" xmlns:mc="http://schemas.openxmlformats.org/markup-compatibility/2006" xmlns="" r:id="rId29" roundtripDataSignature="AMtx7mjYSJr9dBhpBi3R8tFsPF3I3gzuVA=="/>
     </p:ext>
   </p:extLst>
 </p:presentation>
@@ -3075,7 +3076,7 @@
           <a:p>
             <a:fld id="{BF4F8DC3-0006-B147-AA6D-FF436E850004}" type="datetimeFigureOut">
               <a:rPr lang="en-US" smtClean="0"/>
-              <a:t>8/27/21</a:t>
+              <a:t>9/10/21</a:t>
             </a:fld>
             <a:endParaRPr lang="en-US"/>
           </a:p>
@@ -24239,6 +24240,782 @@
     <p:extLst>
       <p:ext uri="{BB962C8B-B14F-4D97-AF65-F5344CB8AC3E}">
         <p14:creationId xmlns:p14="http://schemas.microsoft.com/office/powerpoint/2010/main" val="1937973647"/>
+      </p:ext>
+    </p:extLst>
+  </p:cSld>
+  <p:clrMapOvr>
+    <a:masterClrMapping/>
+  </p:clrMapOvr>
+</p:sld>
+</file>
+
+<file path=ppt/slides/slide22.xml><?xml version="1.0" encoding="utf-8"?>
+<p:sld xmlns:a="http://schemas.openxmlformats.org/drawingml/2006/main" xmlns:r="http://schemas.openxmlformats.org/officeDocument/2006/relationships" xmlns:p="http://schemas.openxmlformats.org/presentationml/2006/main">
+  <p:cSld>
+    <p:spTree>
+      <p:nvGrpSpPr>
+        <p:cNvPr id="1" name=""/>
+        <p:cNvGrpSpPr/>
+        <p:nvPr/>
+      </p:nvGrpSpPr>
+      <p:grpSpPr>
+        <a:xfrm>
+          <a:off x="0" y="0"/>
+          <a:ext cx="0" cy="0"/>
+          <a:chOff x="0" y="0"/>
+          <a:chExt cx="0" cy="0"/>
+        </a:xfrm>
+      </p:grpSpPr>
+      <p:sp>
+        <p:nvSpPr>
+          <p:cNvPr id="33" name="Cloud 32">
+            <a:extLst>
+              <a:ext uri="{FF2B5EF4-FFF2-40B4-BE49-F238E27FC236}">
+                <a16:creationId xmlns:a16="http://schemas.microsoft.com/office/drawing/2014/main" id="{C10B5BDE-F069-2145-AE9C-5EA48F3338B2}"/>
+              </a:ext>
+            </a:extLst>
+          </p:cNvPr>
+          <p:cNvSpPr/>
+          <p:nvPr/>
+        </p:nvSpPr>
+        <p:spPr>
+          <a:xfrm>
+            <a:off x="4984189" y="3216302"/>
+            <a:ext cx="1285299" cy="743178"/>
+          </a:xfrm>
+          <a:prstGeom prst="cloud">
+            <a:avLst/>
+          </a:prstGeom>
+          <a:solidFill>
+            <a:schemeClr val="bg1">
+              <a:lumMod val="65000"/>
+            </a:schemeClr>
+          </a:solidFill>
+          <a:ln w="9525">
+            <a:solidFill>
+              <a:srgbClr val="6A99D0"/>
+            </a:solidFill>
+          </a:ln>
+        </p:spPr>
+        <p:style>
+          <a:lnRef idx="2">
+            <a:schemeClr val="accent1">
+              <a:shade val="50000"/>
+            </a:schemeClr>
+          </a:lnRef>
+          <a:fillRef idx="1">
+            <a:schemeClr val="accent1"/>
+          </a:fillRef>
+          <a:effectRef idx="0">
+            <a:schemeClr val="accent1"/>
+          </a:effectRef>
+          <a:fontRef idx="minor">
+            <a:schemeClr val="lt1"/>
+          </a:fontRef>
+        </p:style>
+        <p:txBody>
+          <a:bodyPr rtlCol="0" anchor="ctr"/>
+          <a:lstStyle/>
+          <a:p>
+            <a:pPr algn="ctr"/>
+            <a:r>
+              <a:rPr lang="en-US" dirty="0">
+                <a:latin typeface="Calibri" charset="0"/>
+                <a:ea typeface="Calibri" charset="0"/>
+                <a:cs typeface="Calibri" charset="0"/>
+              </a:rPr>
+              <a:t>Physical Cluster</a:t>
+            </a:r>
+          </a:p>
+        </p:txBody>
+      </p:sp>
+      <p:sp>
+        <p:nvSpPr>
+          <p:cNvPr id="31" name="Cloud 30">
+            <a:extLst>
+              <a:ext uri="{FF2B5EF4-FFF2-40B4-BE49-F238E27FC236}">
+                <a16:creationId xmlns:a16="http://schemas.microsoft.com/office/drawing/2014/main" id="{CD750ABA-FAED-574D-A0E2-C6E24061CEE0}"/>
+              </a:ext>
+            </a:extLst>
+          </p:cNvPr>
+          <p:cNvSpPr/>
+          <p:nvPr/>
+        </p:nvSpPr>
+        <p:spPr>
+          <a:xfrm>
+            <a:off x="1511087" y="2248953"/>
+            <a:ext cx="2718615" cy="1651261"/>
+          </a:xfrm>
+          <a:prstGeom prst="cloud">
+            <a:avLst/>
+          </a:prstGeom>
+          <a:solidFill>
+            <a:schemeClr val="bg1">
+              <a:lumMod val="65000"/>
+            </a:schemeClr>
+          </a:solidFill>
+          <a:ln w="9525">
+            <a:solidFill>
+              <a:srgbClr val="6A99D0"/>
+            </a:solidFill>
+          </a:ln>
+        </p:spPr>
+        <p:style>
+          <a:lnRef idx="2">
+            <a:schemeClr val="accent1">
+              <a:shade val="50000"/>
+            </a:schemeClr>
+          </a:lnRef>
+          <a:fillRef idx="1">
+            <a:schemeClr val="accent1"/>
+          </a:fillRef>
+          <a:effectRef idx="0">
+            <a:schemeClr val="accent1"/>
+          </a:effectRef>
+          <a:fontRef idx="minor">
+            <a:schemeClr val="lt1"/>
+          </a:fontRef>
+        </p:style>
+        <p:txBody>
+          <a:bodyPr rtlCol="0" anchor="ctr"/>
+          <a:lstStyle/>
+          <a:p>
+            <a:pPr algn="ctr"/>
+            <a:r>
+              <a:rPr lang="en-US" sz="1600" dirty="0">
+                <a:latin typeface="Calibri" charset="0"/>
+                <a:ea typeface="Calibri" charset="0"/>
+                <a:cs typeface="Calibri" charset="0"/>
+              </a:rPr>
+              <a:t>Commercial Cloud</a:t>
+            </a:r>
+          </a:p>
+        </p:txBody>
+      </p:sp>
+      <p:sp>
+        <p:nvSpPr>
+          <p:cNvPr id="5" name="Rounded Rectangle 4"/>
+          <p:cNvSpPr/>
+          <p:nvPr/>
+        </p:nvSpPr>
+        <p:spPr>
+          <a:xfrm>
+            <a:off x="1511087" y="2251152"/>
+            <a:ext cx="2718614" cy="320597"/>
+          </a:xfrm>
+          <a:prstGeom prst="roundRect">
+            <a:avLst/>
+          </a:prstGeom>
+          <a:ln w="28575">
+            <a:noFill/>
+          </a:ln>
+        </p:spPr>
+        <p:style>
+          <a:lnRef idx="3">
+            <a:schemeClr val="lt1"/>
+          </a:lnRef>
+          <a:fillRef idx="1">
+            <a:schemeClr val="accent1"/>
+          </a:fillRef>
+          <a:effectRef idx="1">
+            <a:schemeClr val="accent1"/>
+          </a:effectRef>
+          <a:fontRef idx="minor">
+            <a:schemeClr val="lt1"/>
+          </a:fontRef>
+        </p:style>
+        <p:txBody>
+          <a:bodyPr rtlCol="0" anchor="ctr"/>
+          <a:lstStyle/>
+          <a:p>
+            <a:pPr algn="ctr"/>
+            <a:r>
+              <a:rPr lang="en-US" sz="1200" dirty="0">
+                <a:solidFill>
+                  <a:schemeClr val="bg1"/>
+                </a:solidFill>
+                <a:latin typeface="Calibri" panose="020F0502020204030204" pitchFamily="34" charset="0"/>
+                <a:cs typeface="Calibri" panose="020F0502020204030204" pitchFamily="34" charset="0"/>
+              </a:rPr>
+              <a:t>Provisioning API (GCP)</a:t>
+            </a:r>
+          </a:p>
+        </p:txBody>
+      </p:sp>
+      <p:cxnSp>
+        <p:nvCxnSpPr>
+          <p:cNvPr id="13" name="Straight Arrow Connector 12">
+            <a:extLst>
+              <a:ext uri="{FF2B5EF4-FFF2-40B4-BE49-F238E27FC236}">
+                <a16:creationId xmlns:a16="http://schemas.microsoft.com/office/drawing/2014/main" id="{0301FB1A-6744-084E-B647-C60C4457EF11}"/>
+              </a:ext>
+            </a:extLst>
+          </p:cNvPr>
+          <p:cNvCxnSpPr>
+            <a:cxnSpLocks/>
+            <a:stCxn id="3" idx="2"/>
+            <a:endCxn id="5" idx="0"/>
+          </p:cNvCxnSpPr>
+          <p:nvPr/>
+        </p:nvCxnSpPr>
+        <p:spPr>
+          <a:xfrm>
+            <a:off x="2870394" y="1342398"/>
+            <a:ext cx="0" cy="908754"/>
+          </a:xfrm>
+          <a:prstGeom prst="straightConnector1">
+            <a:avLst/>
+          </a:prstGeom>
+          <a:ln w="19050">
+            <a:solidFill>
+              <a:srgbClr val="6A99D0"/>
+            </a:solidFill>
+            <a:tailEnd type="triangle"/>
+          </a:ln>
+        </p:spPr>
+        <p:style>
+          <a:lnRef idx="1">
+            <a:schemeClr val="accent1"/>
+          </a:lnRef>
+          <a:fillRef idx="0">
+            <a:schemeClr val="accent1"/>
+          </a:fillRef>
+          <a:effectRef idx="0">
+            <a:schemeClr val="accent1"/>
+          </a:effectRef>
+          <a:fontRef idx="minor">
+            <a:schemeClr val="tx1"/>
+          </a:fontRef>
+        </p:style>
+      </p:cxnSp>
+      <p:cxnSp>
+        <p:nvCxnSpPr>
+          <p:cNvPr id="42" name="Straight Arrow Connector 41">
+            <a:extLst>
+              <a:ext uri="{FF2B5EF4-FFF2-40B4-BE49-F238E27FC236}">
+                <a16:creationId xmlns:a16="http://schemas.microsoft.com/office/drawing/2014/main" id="{B438BCBE-981E-7443-97E2-25C98FC32473}"/>
+              </a:ext>
+            </a:extLst>
+          </p:cNvPr>
+          <p:cNvCxnSpPr>
+            <a:cxnSpLocks/>
+            <a:stCxn id="14" idx="2"/>
+            <a:endCxn id="12" idx="0"/>
+          </p:cNvCxnSpPr>
+          <p:nvPr/>
+        </p:nvCxnSpPr>
+        <p:spPr>
+          <a:xfrm>
+            <a:off x="6339378" y="1351128"/>
+            <a:ext cx="1" cy="897825"/>
+          </a:xfrm>
+          <a:prstGeom prst="straightConnector1">
+            <a:avLst/>
+          </a:prstGeom>
+          <a:ln w="19050">
+            <a:solidFill>
+              <a:srgbClr val="6A99D0"/>
+            </a:solidFill>
+            <a:prstDash val="solid"/>
+            <a:tailEnd type="triangle"/>
+          </a:ln>
+        </p:spPr>
+        <p:style>
+          <a:lnRef idx="1">
+            <a:schemeClr val="accent1"/>
+          </a:lnRef>
+          <a:fillRef idx="0">
+            <a:schemeClr val="accent1"/>
+          </a:fillRef>
+          <a:effectRef idx="0">
+            <a:schemeClr val="accent1"/>
+          </a:effectRef>
+          <a:fontRef idx="minor">
+            <a:schemeClr val="tx1"/>
+          </a:fontRef>
+        </p:style>
+      </p:cxnSp>
+      <p:sp>
+        <p:nvSpPr>
+          <p:cNvPr id="3" name="Rounded Rectangle 2"/>
+          <p:cNvSpPr/>
+          <p:nvPr/>
+        </p:nvSpPr>
+        <p:spPr>
+          <a:xfrm>
+            <a:off x="1511086" y="593299"/>
+            <a:ext cx="2718615" cy="749099"/>
+          </a:xfrm>
+          <a:prstGeom prst="roundRect">
+            <a:avLst>
+              <a:gd name="adj" fmla="val 11093"/>
+            </a:avLst>
+          </a:prstGeom>
+          <a:solidFill>
+            <a:schemeClr val="accent1">
+              <a:lumMod val="20000"/>
+              <a:lumOff val="80000"/>
+            </a:schemeClr>
+          </a:solidFill>
+          <a:ln>
+            <a:solidFill>
+              <a:srgbClr val="C2D6EC"/>
+            </a:solidFill>
+          </a:ln>
+        </p:spPr>
+        <p:style>
+          <a:lnRef idx="1">
+            <a:schemeClr val="accent1"/>
+          </a:lnRef>
+          <a:fillRef idx="2">
+            <a:schemeClr val="accent1"/>
+          </a:fillRef>
+          <a:effectRef idx="1">
+            <a:schemeClr val="accent1"/>
+          </a:effectRef>
+          <a:fontRef idx="minor">
+            <a:schemeClr val="dk1"/>
+          </a:fontRef>
+        </p:style>
+        <p:txBody>
+          <a:bodyPr rtlCol="0" anchor="ctr"/>
+          <a:lstStyle/>
+          <a:p>
+            <a:pPr algn="ctr"/>
+            <a:r>
+              <a:rPr lang="en-US" sz="1600" dirty="0">
+                <a:latin typeface="Calibri" panose="020F0502020204030204" pitchFamily="34" charset="0"/>
+                <a:cs typeface="Calibri" panose="020F0502020204030204" pitchFamily="34" charset="0"/>
+              </a:rPr>
+              <a:t>Infrastructure-as-Code</a:t>
+            </a:r>
+          </a:p>
+          <a:p>
+            <a:pPr algn="ctr"/>
+            <a:r>
+              <a:rPr lang="en-US" sz="1600" dirty="0">
+                <a:latin typeface="Calibri" panose="020F0502020204030204" pitchFamily="34" charset="0"/>
+                <a:cs typeface="Calibri" panose="020F0502020204030204" pitchFamily="34" charset="0"/>
+              </a:rPr>
+              <a:t>(Terraform)</a:t>
+            </a:r>
+          </a:p>
+        </p:txBody>
+      </p:sp>
+      <p:sp>
+        <p:nvSpPr>
+          <p:cNvPr id="10" name="Cloud 9">
+            <a:extLst>
+              <a:ext uri="{FF2B5EF4-FFF2-40B4-BE49-F238E27FC236}">
+                <a16:creationId xmlns:a16="http://schemas.microsoft.com/office/drawing/2014/main" id="{0196CB82-9D30-3D41-BE31-1CFF0C29B4FA}"/>
+              </a:ext>
+            </a:extLst>
+          </p:cNvPr>
+          <p:cNvSpPr/>
+          <p:nvPr/>
+        </p:nvSpPr>
+        <p:spPr>
+          <a:xfrm>
+            <a:off x="6413387" y="3216302"/>
+            <a:ext cx="1285299" cy="680423"/>
+          </a:xfrm>
+          <a:prstGeom prst="cloud">
+            <a:avLst/>
+          </a:prstGeom>
+          <a:solidFill>
+            <a:schemeClr val="bg1">
+              <a:lumMod val="65000"/>
+            </a:schemeClr>
+          </a:solidFill>
+          <a:ln w="9525">
+            <a:solidFill>
+              <a:srgbClr val="6A99D0"/>
+            </a:solidFill>
+          </a:ln>
+        </p:spPr>
+        <p:style>
+          <a:lnRef idx="2">
+            <a:schemeClr val="accent1">
+              <a:shade val="50000"/>
+            </a:schemeClr>
+          </a:lnRef>
+          <a:fillRef idx="1">
+            <a:schemeClr val="accent1"/>
+          </a:fillRef>
+          <a:effectRef idx="0">
+            <a:schemeClr val="accent1"/>
+          </a:effectRef>
+          <a:fontRef idx="minor">
+            <a:schemeClr val="lt1"/>
+          </a:fontRef>
+        </p:style>
+        <p:txBody>
+          <a:bodyPr rtlCol="0" anchor="ctr"/>
+          <a:lstStyle/>
+          <a:p>
+            <a:pPr algn="ctr"/>
+            <a:r>
+              <a:rPr lang="en-US" dirty="0">
+                <a:latin typeface="Calibri" charset="0"/>
+                <a:ea typeface="Calibri" charset="0"/>
+                <a:cs typeface="Calibri" charset="0"/>
+              </a:rPr>
+              <a:t>Physical Cluster</a:t>
+            </a:r>
+          </a:p>
+        </p:txBody>
+      </p:sp>
+      <p:sp>
+        <p:nvSpPr>
+          <p:cNvPr id="4" name="TextBox 3">
+            <a:extLst>
+              <a:ext uri="{FF2B5EF4-FFF2-40B4-BE49-F238E27FC236}">
+                <a16:creationId xmlns:a16="http://schemas.microsoft.com/office/drawing/2014/main" id="{2BC8A701-37EE-004E-9828-51F6E489F362}"/>
+              </a:ext>
+            </a:extLst>
+          </p:cNvPr>
+          <p:cNvSpPr txBox="1"/>
+          <p:nvPr/>
+        </p:nvSpPr>
+        <p:spPr>
+          <a:xfrm>
+            <a:off x="6172161" y="3556513"/>
+            <a:ext cx="338554" cy="276999"/>
+          </a:xfrm>
+          <a:prstGeom prst="rect">
+            <a:avLst/>
+          </a:prstGeom>
+          <a:noFill/>
+        </p:spPr>
+        <p:txBody>
+          <a:bodyPr wrap="none" rtlCol="0">
+            <a:spAutoFit/>
+          </a:bodyPr>
+          <a:lstStyle/>
+          <a:p>
+            <a:r>
+              <a:rPr lang="en-US" sz="1200" dirty="0"/>
+              <a:t>…</a:t>
+            </a:r>
+          </a:p>
+        </p:txBody>
+      </p:sp>
+      <p:sp>
+        <p:nvSpPr>
+          <p:cNvPr id="12" name="Rounded Rectangle 11">
+            <a:extLst>
+              <a:ext uri="{FF2B5EF4-FFF2-40B4-BE49-F238E27FC236}">
+                <a16:creationId xmlns:a16="http://schemas.microsoft.com/office/drawing/2014/main" id="{88B46C13-816E-A043-BC52-11246630F961}"/>
+              </a:ext>
+            </a:extLst>
+          </p:cNvPr>
+          <p:cNvSpPr/>
+          <p:nvPr/>
+        </p:nvSpPr>
+        <p:spPr>
+          <a:xfrm>
+            <a:off x="4980071" y="2248953"/>
+            <a:ext cx="2718615" cy="322796"/>
+          </a:xfrm>
+          <a:prstGeom prst="roundRect">
+            <a:avLst/>
+          </a:prstGeom>
+          <a:ln w="28575">
+            <a:noFill/>
+          </a:ln>
+        </p:spPr>
+        <p:style>
+          <a:lnRef idx="3">
+            <a:schemeClr val="lt1"/>
+          </a:lnRef>
+          <a:fillRef idx="1">
+            <a:schemeClr val="accent1"/>
+          </a:fillRef>
+          <a:effectRef idx="1">
+            <a:schemeClr val="accent1"/>
+          </a:effectRef>
+          <a:fontRef idx="minor">
+            <a:schemeClr val="lt1"/>
+          </a:fontRef>
+        </p:style>
+        <p:txBody>
+          <a:bodyPr rtlCol="0" anchor="ctr"/>
+          <a:lstStyle/>
+          <a:p>
+            <a:pPr algn="ctr"/>
+            <a:r>
+              <a:rPr lang="en-US" sz="1200" dirty="0">
+                <a:solidFill>
+                  <a:schemeClr val="bg1"/>
+                </a:solidFill>
+                <a:latin typeface="Calibri" panose="020F0502020204030204" pitchFamily="34" charset="0"/>
+                <a:cs typeface="Calibri" panose="020F0502020204030204" pitchFamily="34" charset="0"/>
+              </a:rPr>
+              <a:t>Provisioning API (Rancher)</a:t>
+            </a:r>
+          </a:p>
+        </p:txBody>
+      </p:sp>
+      <p:cxnSp>
+        <p:nvCxnSpPr>
+          <p:cNvPr id="7" name="Straight Arrow Connector 6">
+            <a:extLst>
+              <a:ext uri="{FF2B5EF4-FFF2-40B4-BE49-F238E27FC236}">
+                <a16:creationId xmlns:a16="http://schemas.microsoft.com/office/drawing/2014/main" id="{2F40721E-DFE6-F147-8A24-FA0A70BB758A}"/>
+              </a:ext>
+            </a:extLst>
+          </p:cNvPr>
+          <p:cNvCxnSpPr>
+            <a:cxnSpLocks/>
+            <a:stCxn id="12" idx="2"/>
+            <a:endCxn id="33" idx="3"/>
+          </p:cNvCxnSpPr>
+          <p:nvPr/>
+        </p:nvCxnSpPr>
+        <p:spPr>
+          <a:xfrm flipH="1">
+            <a:off x="5626839" y="2571749"/>
+            <a:ext cx="712540" cy="687045"/>
+          </a:xfrm>
+          <a:prstGeom prst="straightConnector1">
+            <a:avLst/>
+          </a:prstGeom>
+          <a:ln>
+            <a:tailEnd type="triangle"/>
+          </a:ln>
+        </p:spPr>
+        <p:style>
+          <a:lnRef idx="1">
+            <a:schemeClr val="accent1"/>
+          </a:lnRef>
+          <a:fillRef idx="0">
+            <a:schemeClr val="accent1"/>
+          </a:fillRef>
+          <a:effectRef idx="0">
+            <a:schemeClr val="accent1"/>
+          </a:effectRef>
+          <a:fontRef idx="minor">
+            <a:schemeClr val="tx1"/>
+          </a:fontRef>
+        </p:style>
+      </p:cxnSp>
+      <p:cxnSp>
+        <p:nvCxnSpPr>
+          <p:cNvPr id="15" name="Straight Arrow Connector 14">
+            <a:extLst>
+              <a:ext uri="{FF2B5EF4-FFF2-40B4-BE49-F238E27FC236}">
+                <a16:creationId xmlns:a16="http://schemas.microsoft.com/office/drawing/2014/main" id="{BF55FA72-A818-3840-9AD4-1FD6E3BDBD46}"/>
+              </a:ext>
+            </a:extLst>
+          </p:cNvPr>
+          <p:cNvCxnSpPr>
+            <a:cxnSpLocks/>
+            <a:stCxn id="12" idx="2"/>
+            <a:endCxn id="10" idx="3"/>
+          </p:cNvCxnSpPr>
+          <p:nvPr/>
+        </p:nvCxnSpPr>
+        <p:spPr>
+          <a:xfrm>
+            <a:off x="6339379" y="2571749"/>
+            <a:ext cx="716658" cy="683457"/>
+          </a:xfrm>
+          <a:prstGeom prst="straightConnector1">
+            <a:avLst/>
+          </a:prstGeom>
+          <a:ln>
+            <a:tailEnd type="triangle"/>
+          </a:ln>
+        </p:spPr>
+        <p:style>
+          <a:lnRef idx="1">
+            <a:schemeClr val="accent1"/>
+          </a:lnRef>
+          <a:fillRef idx="0">
+            <a:schemeClr val="accent1"/>
+          </a:fillRef>
+          <a:effectRef idx="0">
+            <a:schemeClr val="accent1"/>
+          </a:effectRef>
+          <a:fontRef idx="minor">
+            <a:schemeClr val="tx1"/>
+          </a:fontRef>
+        </p:style>
+      </p:cxnSp>
+      <p:sp>
+        <p:nvSpPr>
+          <p:cNvPr id="14" name="Rounded Rectangle 13">
+            <a:extLst>
+              <a:ext uri="{FF2B5EF4-FFF2-40B4-BE49-F238E27FC236}">
+                <a16:creationId xmlns:a16="http://schemas.microsoft.com/office/drawing/2014/main" id="{B1313726-35AE-B447-8655-E690FF97C67E}"/>
+              </a:ext>
+            </a:extLst>
+          </p:cNvPr>
+          <p:cNvSpPr/>
+          <p:nvPr/>
+        </p:nvSpPr>
+        <p:spPr>
+          <a:xfrm>
+            <a:off x="4980070" y="602029"/>
+            <a:ext cx="2718615" cy="749099"/>
+          </a:xfrm>
+          <a:prstGeom prst="roundRect">
+            <a:avLst>
+              <a:gd name="adj" fmla="val 11093"/>
+            </a:avLst>
+          </a:prstGeom>
+          <a:solidFill>
+            <a:schemeClr val="accent1">
+              <a:lumMod val="20000"/>
+              <a:lumOff val="80000"/>
+            </a:schemeClr>
+          </a:solidFill>
+          <a:ln>
+            <a:solidFill>
+              <a:srgbClr val="C2D6EC"/>
+            </a:solidFill>
+          </a:ln>
+        </p:spPr>
+        <p:style>
+          <a:lnRef idx="1">
+            <a:schemeClr val="accent1"/>
+          </a:lnRef>
+          <a:fillRef idx="2">
+            <a:schemeClr val="accent1"/>
+          </a:fillRef>
+          <a:effectRef idx="1">
+            <a:schemeClr val="accent1"/>
+          </a:effectRef>
+          <a:fontRef idx="minor">
+            <a:schemeClr val="dk1"/>
+          </a:fontRef>
+        </p:style>
+        <p:txBody>
+          <a:bodyPr rtlCol="0" anchor="ctr"/>
+          <a:lstStyle/>
+          <a:p>
+            <a:pPr algn="ctr"/>
+            <a:r>
+              <a:rPr lang="en-US" sz="1600">
+                <a:latin typeface="Calibri" panose="020F0502020204030204" pitchFamily="34" charset="0"/>
+                <a:cs typeface="Calibri" panose="020F0502020204030204" pitchFamily="34" charset="0"/>
+              </a:rPr>
+              <a:t>Configuration-as-Code</a:t>
+            </a:r>
+            <a:endParaRPr lang="en-US" sz="1600" dirty="0">
+              <a:latin typeface="Calibri" panose="020F0502020204030204" pitchFamily="34" charset="0"/>
+              <a:cs typeface="Calibri" panose="020F0502020204030204" pitchFamily="34" charset="0"/>
+            </a:endParaRPr>
+          </a:p>
+          <a:p>
+            <a:pPr algn="ctr"/>
+            <a:r>
+              <a:rPr lang="en-US" sz="1600" dirty="0">
+                <a:latin typeface="Calibri" panose="020F0502020204030204" pitchFamily="34" charset="0"/>
+                <a:cs typeface="Calibri" panose="020F0502020204030204" pitchFamily="34" charset="0"/>
+              </a:rPr>
+              <a:t>(Fleet)</a:t>
+            </a:r>
+          </a:p>
+        </p:txBody>
+      </p:sp>
+      <p:cxnSp>
+        <p:nvCxnSpPr>
+          <p:cNvPr id="21" name="Straight Arrow Connector 20">
+            <a:extLst>
+              <a:ext uri="{FF2B5EF4-FFF2-40B4-BE49-F238E27FC236}">
+                <a16:creationId xmlns:a16="http://schemas.microsoft.com/office/drawing/2014/main" id="{D562A118-6593-794E-A54C-FA618FF6047C}"/>
+              </a:ext>
+            </a:extLst>
+          </p:cNvPr>
+          <p:cNvCxnSpPr>
+            <a:cxnSpLocks/>
+            <a:stCxn id="14" idx="2"/>
+            <a:endCxn id="5" idx="0"/>
+          </p:cNvCxnSpPr>
+          <p:nvPr/>
+        </p:nvCxnSpPr>
+        <p:spPr>
+          <a:xfrm flipH="1">
+            <a:off x="2870394" y="1351128"/>
+            <a:ext cx="3468984" cy="900024"/>
+          </a:xfrm>
+          <a:prstGeom prst="straightConnector1">
+            <a:avLst/>
+          </a:prstGeom>
+          <a:ln w="19050">
+            <a:solidFill>
+              <a:srgbClr val="6A99D0"/>
+            </a:solidFill>
+            <a:prstDash val="solid"/>
+            <a:tailEnd type="triangle"/>
+          </a:ln>
+        </p:spPr>
+        <p:style>
+          <a:lnRef idx="1">
+            <a:schemeClr val="accent1"/>
+          </a:lnRef>
+          <a:fillRef idx="0">
+            <a:schemeClr val="accent1"/>
+          </a:fillRef>
+          <a:effectRef idx="0">
+            <a:schemeClr val="accent1"/>
+          </a:effectRef>
+          <a:fontRef idx="minor">
+            <a:schemeClr val="tx1"/>
+          </a:fontRef>
+        </p:style>
+      </p:cxnSp>
+      <p:cxnSp>
+        <p:nvCxnSpPr>
+          <p:cNvPr id="24" name="Straight Arrow Connector 23">
+            <a:extLst>
+              <a:ext uri="{FF2B5EF4-FFF2-40B4-BE49-F238E27FC236}">
+                <a16:creationId xmlns:a16="http://schemas.microsoft.com/office/drawing/2014/main" id="{6130D76F-925D-234F-AE0F-581EF0D2CDEA}"/>
+              </a:ext>
+            </a:extLst>
+          </p:cNvPr>
+          <p:cNvCxnSpPr>
+            <a:cxnSpLocks/>
+            <a:stCxn id="3" idx="2"/>
+            <a:endCxn id="12" idx="0"/>
+          </p:cNvCxnSpPr>
+          <p:nvPr/>
+        </p:nvCxnSpPr>
+        <p:spPr>
+          <a:xfrm>
+            <a:off x="2870394" y="1342398"/>
+            <a:ext cx="3468985" cy="906555"/>
+          </a:xfrm>
+          <a:prstGeom prst="straightConnector1">
+            <a:avLst/>
+          </a:prstGeom>
+          <a:ln w="19050">
+            <a:solidFill>
+              <a:srgbClr val="6A99D0"/>
+            </a:solidFill>
+            <a:tailEnd type="triangle"/>
+          </a:ln>
+        </p:spPr>
+        <p:style>
+          <a:lnRef idx="1">
+            <a:schemeClr val="accent1"/>
+          </a:lnRef>
+          <a:fillRef idx="0">
+            <a:schemeClr val="accent1"/>
+          </a:fillRef>
+          <a:effectRef idx="0">
+            <a:schemeClr val="accent1"/>
+          </a:effectRef>
+          <a:fontRef idx="minor">
+            <a:schemeClr val="tx1"/>
+          </a:fontRef>
+        </p:style>
+      </p:cxnSp>
+    </p:spTree>
+    <p:extLst>
+      <p:ext uri="{BB962C8B-B14F-4D97-AF65-F5344CB8AC3E}">
+        <p14:creationId xmlns:p14="http://schemas.microsoft.com/office/powerpoint/2010/main" val="957257128"/>
       </p:ext>
     </p:extLst>
   </p:cSld>

</xml_diff>

<commit_message>
initial draft of monitoring
</commit_message>
<xml_diff>
--- a/figures.pptx
+++ b/figures.pptx
@@ -5,7 +5,7 @@
     <p:sldMasterId id="2147483648" r:id="rId1"/>
   </p:sldMasterIdLst>
   <p:notesMasterIdLst>
-    <p:notesMasterId r:id="rId24"/>
+    <p:notesMasterId r:id="rId25"/>
   </p:notesMasterIdLst>
   <p:sldIdLst>
     <p:sldId id="311" r:id="rId2"/>
@@ -30,6 +30,7 @@
     <p:sldId id="347" r:id="rId21"/>
     <p:sldId id="348" r:id="rId22"/>
     <p:sldId id="349" r:id="rId23"/>
+    <p:sldId id="350" r:id="rId24"/>
   </p:sldIdLst>
   <p:sldSz cx="9144000" cy="5143500" type="screen16x9"/>
   <p:notesSz cx="6858000" cy="9144000"/>
@@ -25083,6 +25084,655 @@
     <p:extLst>
       <p:ext uri="{BB962C8B-B14F-4D97-AF65-F5344CB8AC3E}">
         <p14:creationId xmlns:p14="http://schemas.microsoft.com/office/powerpoint/2010/main" val="957257128"/>
+      </p:ext>
+    </p:extLst>
+  </p:cSld>
+  <p:clrMapOvr>
+    <a:masterClrMapping/>
+  </p:clrMapOvr>
+</p:sld>
+</file>
+
+<file path=ppt/slides/slide23.xml><?xml version="1.0" encoding="utf-8"?>
+<p:sld xmlns:a="http://schemas.openxmlformats.org/drawingml/2006/main" xmlns:r="http://schemas.openxmlformats.org/officeDocument/2006/relationships" xmlns:p="http://schemas.openxmlformats.org/presentationml/2006/main">
+  <p:cSld>
+    <p:spTree>
+      <p:nvGrpSpPr>
+        <p:cNvPr id="1" name=""/>
+        <p:cNvGrpSpPr/>
+        <p:nvPr/>
+      </p:nvGrpSpPr>
+      <p:grpSpPr>
+        <a:xfrm>
+          <a:off x="0" y="0"/>
+          <a:ext cx="0" cy="0"/>
+          <a:chOff x="0" y="0"/>
+          <a:chExt cx="0" cy="0"/>
+        </a:xfrm>
+      </p:grpSpPr>
+      <p:sp>
+        <p:nvSpPr>
+          <p:cNvPr id="3" name="Google Shape;605;p62">
+            <a:extLst>
+              <a:ext uri="{FF2B5EF4-FFF2-40B4-BE49-F238E27FC236}">
+                <a16:creationId xmlns:a16="http://schemas.microsoft.com/office/drawing/2014/main" id="{536EE0CB-DCFD-8049-9D20-ED314C94C18A}"/>
+              </a:ext>
+            </a:extLst>
+          </p:cNvPr>
+          <p:cNvSpPr/>
+          <p:nvPr/>
+        </p:nvSpPr>
+        <p:spPr>
+          <a:xfrm>
+            <a:off x="1918447" y="1034075"/>
+            <a:ext cx="1132141" cy="794100"/>
+          </a:xfrm>
+          <a:prstGeom prst="roundRect">
+            <a:avLst>
+              <a:gd name="adj" fmla="val 16667"/>
+            </a:avLst>
+          </a:prstGeom>
+          <a:solidFill>
+            <a:srgbClr val="D9D9D9"/>
+          </a:solidFill>
+          <a:ln>
+            <a:noFill/>
+          </a:ln>
+        </p:spPr>
+        <p:txBody>
+          <a:bodyPr spcFirstLastPara="1" wrap="square" lIns="91425" tIns="91425" rIns="91425" bIns="91425" anchor="b" anchorCtr="0">
+            <a:noAutofit/>
+          </a:bodyPr>
+          <a:lstStyle/>
+          <a:p>
+            <a:pPr marL="0" lvl="0" indent="0" algn="l" rtl="0">
+              <a:spcBef>
+                <a:spcPts val="0"/>
+              </a:spcBef>
+              <a:spcAft>
+                <a:spcPts val="0"/>
+              </a:spcAft>
+              <a:buNone/>
+            </a:pPr>
+            <a:r>
+              <a:rPr lang="en" sz="1200" dirty="0">
+                <a:latin typeface="Open Sans"/>
+                <a:ea typeface="Open Sans"/>
+                <a:cs typeface="Open Sans"/>
+                <a:sym typeface="Open Sans"/>
+              </a:rPr>
+              <a:t>Worker</a:t>
+            </a:r>
+          </a:p>
+          <a:p>
+            <a:pPr marL="0" lvl="0" indent="0" algn="l" rtl="0">
+              <a:spcBef>
+                <a:spcPts val="0"/>
+              </a:spcBef>
+              <a:spcAft>
+                <a:spcPts val="0"/>
+              </a:spcAft>
+              <a:buNone/>
+            </a:pPr>
+            <a:r>
+              <a:rPr lang="en" sz="1200" dirty="0">
+                <a:latin typeface="Open Sans"/>
+                <a:ea typeface="Open Sans"/>
+                <a:cs typeface="Open Sans"/>
+                <a:sym typeface="Open Sans"/>
+              </a:rPr>
+              <a:t>(SD-Fabric)</a:t>
+            </a:r>
+            <a:endParaRPr sz="1200" dirty="0">
+              <a:latin typeface="Open Sans"/>
+              <a:ea typeface="Open Sans"/>
+              <a:cs typeface="Open Sans"/>
+              <a:sym typeface="Open Sans"/>
+            </a:endParaRPr>
+          </a:p>
+        </p:txBody>
+      </p:sp>
+      <p:pic>
+        <p:nvPicPr>
+          <p:cNvPr id="4" name="Google Shape;606;p62">
+            <a:extLst>
+              <a:ext uri="{FF2B5EF4-FFF2-40B4-BE49-F238E27FC236}">
+                <a16:creationId xmlns:a16="http://schemas.microsoft.com/office/drawing/2014/main" id="{CE50D64E-8823-D34F-B931-BEDDBE804B81}"/>
+              </a:ext>
+            </a:extLst>
+          </p:cNvPr>
+          <p:cNvPicPr preferRelativeResize="0"/>
+          <p:nvPr/>
+        </p:nvPicPr>
+        <p:blipFill>
+          <a:blip r:embed="rId2">
+            <a:alphaModFix/>
+          </a:blip>
+          <a:stretch>
+            <a:fillRect/>
+          </a:stretch>
+        </p:blipFill>
+        <p:spPr>
+          <a:xfrm>
+            <a:off x="2758563" y="858100"/>
+            <a:ext cx="621400" cy="452825"/>
+          </a:xfrm>
+          <a:prstGeom prst="rect">
+            <a:avLst/>
+          </a:prstGeom>
+          <a:noFill/>
+          <a:ln>
+            <a:noFill/>
+          </a:ln>
+        </p:spPr>
+      </p:pic>
+      <p:sp>
+        <p:nvSpPr>
+          <p:cNvPr id="5" name="Google Shape;607;p62">
+            <a:extLst>
+              <a:ext uri="{FF2B5EF4-FFF2-40B4-BE49-F238E27FC236}">
+                <a16:creationId xmlns:a16="http://schemas.microsoft.com/office/drawing/2014/main" id="{B41A6CDE-F804-7240-A211-73FA0826DCB1}"/>
+              </a:ext>
+            </a:extLst>
+          </p:cNvPr>
+          <p:cNvSpPr/>
+          <p:nvPr/>
+        </p:nvSpPr>
+        <p:spPr>
+          <a:xfrm>
+            <a:off x="1918447" y="2126300"/>
+            <a:ext cx="1132141" cy="794100"/>
+          </a:xfrm>
+          <a:prstGeom prst="roundRect">
+            <a:avLst>
+              <a:gd name="adj" fmla="val 16667"/>
+            </a:avLst>
+          </a:prstGeom>
+          <a:solidFill>
+            <a:srgbClr val="D9D9D9"/>
+          </a:solidFill>
+          <a:ln>
+            <a:noFill/>
+          </a:ln>
+        </p:spPr>
+        <p:txBody>
+          <a:bodyPr spcFirstLastPara="1" wrap="square" lIns="91425" tIns="91425" rIns="91425" bIns="91425" anchor="b" anchorCtr="0">
+            <a:noAutofit/>
+          </a:bodyPr>
+          <a:lstStyle/>
+          <a:p>
+            <a:pPr marL="0" lvl="0" indent="0" algn="l" rtl="0">
+              <a:spcBef>
+                <a:spcPts val="0"/>
+              </a:spcBef>
+              <a:spcAft>
+                <a:spcPts val="0"/>
+              </a:spcAft>
+              <a:buNone/>
+            </a:pPr>
+            <a:r>
+              <a:rPr lang="en" sz="1200" dirty="0">
+                <a:latin typeface="Open Sans"/>
+                <a:ea typeface="Open Sans"/>
+                <a:cs typeface="Open Sans"/>
+                <a:sym typeface="Open Sans"/>
+              </a:rPr>
+              <a:t>Worker</a:t>
+            </a:r>
+          </a:p>
+          <a:p>
+            <a:pPr marL="0" lvl="0" indent="0" algn="l" rtl="0">
+              <a:spcBef>
+                <a:spcPts val="0"/>
+              </a:spcBef>
+              <a:spcAft>
+                <a:spcPts val="0"/>
+              </a:spcAft>
+              <a:buNone/>
+            </a:pPr>
+            <a:r>
+              <a:rPr lang="en" sz="1200" dirty="0">
+                <a:latin typeface="Open Sans"/>
+                <a:ea typeface="Open Sans"/>
+                <a:cs typeface="Open Sans"/>
+                <a:sym typeface="Open Sans"/>
+              </a:rPr>
+              <a:t>(SD-RAN)</a:t>
+            </a:r>
+            <a:endParaRPr sz="1200" dirty="0">
+              <a:latin typeface="Open Sans"/>
+              <a:ea typeface="Open Sans"/>
+              <a:cs typeface="Open Sans"/>
+              <a:sym typeface="Open Sans"/>
+            </a:endParaRPr>
+          </a:p>
+        </p:txBody>
+      </p:sp>
+      <p:pic>
+        <p:nvPicPr>
+          <p:cNvPr id="6" name="Google Shape;608;p62">
+            <a:extLst>
+              <a:ext uri="{FF2B5EF4-FFF2-40B4-BE49-F238E27FC236}">
+                <a16:creationId xmlns:a16="http://schemas.microsoft.com/office/drawing/2014/main" id="{23F75398-455A-F848-A0FC-ABCF143EE29C}"/>
+              </a:ext>
+            </a:extLst>
+          </p:cNvPr>
+          <p:cNvPicPr preferRelativeResize="0"/>
+          <p:nvPr/>
+        </p:nvPicPr>
+        <p:blipFill>
+          <a:blip r:embed="rId2">
+            <a:alphaModFix/>
+          </a:blip>
+          <a:stretch>
+            <a:fillRect/>
+          </a:stretch>
+        </p:blipFill>
+        <p:spPr>
+          <a:xfrm>
+            <a:off x="2758563" y="1950325"/>
+            <a:ext cx="621400" cy="452825"/>
+          </a:xfrm>
+          <a:prstGeom prst="rect">
+            <a:avLst/>
+          </a:prstGeom>
+          <a:noFill/>
+          <a:ln>
+            <a:noFill/>
+          </a:ln>
+        </p:spPr>
+      </p:pic>
+      <p:sp>
+        <p:nvSpPr>
+          <p:cNvPr id="7" name="Google Shape;609;p62">
+            <a:extLst>
+              <a:ext uri="{FF2B5EF4-FFF2-40B4-BE49-F238E27FC236}">
+                <a16:creationId xmlns:a16="http://schemas.microsoft.com/office/drawing/2014/main" id="{B7A9B65D-7639-3C48-B15F-8B64606E005B}"/>
+              </a:ext>
+            </a:extLst>
+          </p:cNvPr>
+          <p:cNvSpPr/>
+          <p:nvPr/>
+        </p:nvSpPr>
+        <p:spPr>
+          <a:xfrm>
+            <a:off x="1918447" y="3218525"/>
+            <a:ext cx="1132141" cy="794100"/>
+          </a:xfrm>
+          <a:prstGeom prst="roundRect">
+            <a:avLst>
+              <a:gd name="adj" fmla="val 16667"/>
+            </a:avLst>
+          </a:prstGeom>
+          <a:solidFill>
+            <a:srgbClr val="D9D9D9"/>
+          </a:solidFill>
+          <a:ln>
+            <a:noFill/>
+          </a:ln>
+        </p:spPr>
+        <p:txBody>
+          <a:bodyPr spcFirstLastPara="1" wrap="square" lIns="91425" tIns="91425" rIns="91425" bIns="91425" anchor="b" anchorCtr="0">
+            <a:noAutofit/>
+          </a:bodyPr>
+          <a:lstStyle/>
+          <a:p>
+            <a:pPr marL="0" lvl="0" indent="0" algn="l" rtl="0">
+              <a:spcBef>
+                <a:spcPts val="0"/>
+              </a:spcBef>
+              <a:spcAft>
+                <a:spcPts val="0"/>
+              </a:spcAft>
+              <a:buNone/>
+            </a:pPr>
+            <a:r>
+              <a:rPr lang="en" sz="1200" dirty="0">
+                <a:latin typeface="Open Sans"/>
+                <a:ea typeface="Open Sans"/>
+                <a:cs typeface="Open Sans"/>
+                <a:sym typeface="Open Sans"/>
+              </a:rPr>
+              <a:t>Worker</a:t>
+            </a:r>
+          </a:p>
+          <a:p>
+            <a:pPr marL="0" lvl="0" indent="0" algn="l" rtl="0">
+              <a:spcBef>
+                <a:spcPts val="0"/>
+              </a:spcBef>
+              <a:spcAft>
+                <a:spcPts val="0"/>
+              </a:spcAft>
+              <a:buNone/>
+            </a:pPr>
+            <a:r>
+              <a:rPr lang="en" sz="1200" dirty="0">
+                <a:latin typeface="Open Sans"/>
+                <a:ea typeface="Open Sans"/>
+                <a:cs typeface="Open Sans"/>
+                <a:sym typeface="Open Sans"/>
+              </a:rPr>
+              <a:t>(SD-Core)</a:t>
+            </a:r>
+            <a:endParaRPr sz="1200" dirty="0">
+              <a:latin typeface="Open Sans"/>
+              <a:ea typeface="Open Sans"/>
+              <a:cs typeface="Open Sans"/>
+              <a:sym typeface="Open Sans"/>
+            </a:endParaRPr>
+          </a:p>
+        </p:txBody>
+      </p:sp>
+      <p:pic>
+        <p:nvPicPr>
+          <p:cNvPr id="8" name="Google Shape;610;p62">
+            <a:extLst>
+              <a:ext uri="{FF2B5EF4-FFF2-40B4-BE49-F238E27FC236}">
+                <a16:creationId xmlns:a16="http://schemas.microsoft.com/office/drawing/2014/main" id="{990982DC-5EAE-0D4D-8AE4-DB21241BA221}"/>
+              </a:ext>
+            </a:extLst>
+          </p:cNvPr>
+          <p:cNvPicPr preferRelativeResize="0"/>
+          <p:nvPr/>
+        </p:nvPicPr>
+        <p:blipFill>
+          <a:blip r:embed="rId2">
+            <a:alphaModFix/>
+          </a:blip>
+          <a:stretch>
+            <a:fillRect/>
+          </a:stretch>
+        </p:blipFill>
+        <p:spPr>
+          <a:xfrm>
+            <a:off x="2758563" y="3042550"/>
+            <a:ext cx="621400" cy="452825"/>
+          </a:xfrm>
+          <a:prstGeom prst="rect">
+            <a:avLst/>
+          </a:prstGeom>
+          <a:noFill/>
+          <a:ln>
+            <a:noFill/>
+          </a:ln>
+        </p:spPr>
+      </p:pic>
+      <p:pic>
+        <p:nvPicPr>
+          <p:cNvPr id="9" name="Google Shape;611;p62">
+            <a:extLst>
+              <a:ext uri="{FF2B5EF4-FFF2-40B4-BE49-F238E27FC236}">
+                <a16:creationId xmlns:a16="http://schemas.microsoft.com/office/drawing/2014/main" id="{521C4825-0E9D-B74F-986C-9EA370FC7FF6}"/>
+              </a:ext>
+            </a:extLst>
+          </p:cNvPr>
+          <p:cNvPicPr preferRelativeResize="0"/>
+          <p:nvPr/>
+        </p:nvPicPr>
+        <p:blipFill>
+          <a:blip r:embed="rId3">
+            <a:alphaModFix/>
+          </a:blip>
+          <a:stretch>
+            <a:fillRect/>
+          </a:stretch>
+        </p:blipFill>
+        <p:spPr>
+          <a:xfrm>
+            <a:off x="3911213" y="2126297"/>
+            <a:ext cx="794100" cy="794100"/>
+          </a:xfrm>
+          <a:prstGeom prst="rect">
+            <a:avLst/>
+          </a:prstGeom>
+          <a:noFill/>
+          <a:ln>
+            <a:noFill/>
+          </a:ln>
+        </p:spPr>
+      </p:pic>
+      <p:pic>
+        <p:nvPicPr>
+          <p:cNvPr id="10" name="Google Shape;612;p62">
+            <a:extLst>
+              <a:ext uri="{FF2B5EF4-FFF2-40B4-BE49-F238E27FC236}">
+                <a16:creationId xmlns:a16="http://schemas.microsoft.com/office/drawing/2014/main" id="{A1E2890A-C21A-5C4C-B02C-6199E5DB0C9D}"/>
+              </a:ext>
+            </a:extLst>
+          </p:cNvPr>
+          <p:cNvPicPr preferRelativeResize="0"/>
+          <p:nvPr/>
+        </p:nvPicPr>
+        <p:blipFill>
+          <a:blip r:embed="rId4">
+            <a:alphaModFix/>
+          </a:blip>
+          <a:stretch>
+            <a:fillRect/>
+          </a:stretch>
+        </p:blipFill>
+        <p:spPr>
+          <a:xfrm>
+            <a:off x="4821575" y="2139188"/>
+            <a:ext cx="1476302" cy="768323"/>
+          </a:xfrm>
+          <a:prstGeom prst="rect">
+            <a:avLst/>
+          </a:prstGeom>
+          <a:noFill/>
+          <a:ln>
+            <a:noFill/>
+          </a:ln>
+        </p:spPr>
+      </p:pic>
+      <p:pic>
+        <p:nvPicPr>
+          <p:cNvPr id="11" name="Google Shape;613;p62">
+            <a:extLst>
+              <a:ext uri="{FF2B5EF4-FFF2-40B4-BE49-F238E27FC236}">
+                <a16:creationId xmlns:a16="http://schemas.microsoft.com/office/drawing/2014/main" id="{CCC1E209-D307-B144-A3BD-01AD2E3D596D}"/>
+              </a:ext>
+            </a:extLst>
+          </p:cNvPr>
+          <p:cNvPicPr preferRelativeResize="0"/>
+          <p:nvPr/>
+        </p:nvPicPr>
+        <p:blipFill>
+          <a:blip r:embed="rId5">
+            <a:alphaModFix/>
+          </a:blip>
+          <a:stretch>
+            <a:fillRect/>
+          </a:stretch>
+        </p:blipFill>
+        <p:spPr>
+          <a:xfrm>
+            <a:off x="6370413" y="2160087"/>
+            <a:ext cx="794098" cy="726524"/>
+          </a:xfrm>
+          <a:prstGeom prst="rect">
+            <a:avLst/>
+          </a:prstGeom>
+          <a:noFill/>
+          <a:ln>
+            <a:noFill/>
+          </a:ln>
+        </p:spPr>
+      </p:pic>
+      <p:cxnSp>
+        <p:nvCxnSpPr>
+          <p:cNvPr id="12" name="Google Shape;614;p62">
+            <a:extLst>
+              <a:ext uri="{FF2B5EF4-FFF2-40B4-BE49-F238E27FC236}">
+                <a16:creationId xmlns:a16="http://schemas.microsoft.com/office/drawing/2014/main" id="{95C76043-290B-BC4F-9A7F-5165D5717B40}"/>
+              </a:ext>
+            </a:extLst>
+          </p:cNvPr>
+          <p:cNvCxnSpPr>
+            <a:stCxn id="4" idx="3"/>
+          </p:cNvCxnSpPr>
+          <p:nvPr/>
+        </p:nvCxnSpPr>
+        <p:spPr>
+          <a:xfrm>
+            <a:off x="3379963" y="1084512"/>
+            <a:ext cx="508500" cy="1129800"/>
+          </a:xfrm>
+          <a:prstGeom prst="straightConnector1">
+            <a:avLst/>
+          </a:prstGeom>
+          <a:noFill/>
+          <a:ln w="19050" cap="flat" cmpd="sng">
+            <a:solidFill>
+              <a:srgbClr val="666666"/>
+            </a:solidFill>
+            <a:prstDash val="solid"/>
+            <a:round/>
+            <a:headEnd type="none" w="med" len="med"/>
+            <a:tailEnd type="stealth" w="med" len="med"/>
+          </a:ln>
+        </p:spPr>
+      </p:cxnSp>
+      <p:cxnSp>
+        <p:nvCxnSpPr>
+          <p:cNvPr id="13" name="Google Shape;615;p62">
+            <a:extLst>
+              <a:ext uri="{FF2B5EF4-FFF2-40B4-BE49-F238E27FC236}">
+                <a16:creationId xmlns:a16="http://schemas.microsoft.com/office/drawing/2014/main" id="{471B413F-F32F-BA4C-80C7-C135F57C0438}"/>
+              </a:ext>
+            </a:extLst>
+          </p:cNvPr>
+          <p:cNvCxnSpPr>
+            <a:stCxn id="6" idx="3"/>
+            <a:endCxn id="9" idx="1"/>
+          </p:cNvCxnSpPr>
+          <p:nvPr/>
+        </p:nvCxnSpPr>
+        <p:spPr>
+          <a:xfrm>
+            <a:off x="3379963" y="2176737"/>
+            <a:ext cx="531300" cy="346500"/>
+          </a:xfrm>
+          <a:prstGeom prst="straightConnector1">
+            <a:avLst/>
+          </a:prstGeom>
+          <a:noFill/>
+          <a:ln w="19050" cap="flat" cmpd="sng">
+            <a:solidFill>
+              <a:srgbClr val="666666"/>
+            </a:solidFill>
+            <a:prstDash val="solid"/>
+            <a:round/>
+            <a:headEnd type="none" w="med" len="med"/>
+            <a:tailEnd type="stealth" w="med" len="med"/>
+          </a:ln>
+        </p:spPr>
+      </p:cxnSp>
+      <p:cxnSp>
+        <p:nvCxnSpPr>
+          <p:cNvPr id="14" name="Google Shape;616;p62">
+            <a:extLst>
+              <a:ext uri="{FF2B5EF4-FFF2-40B4-BE49-F238E27FC236}">
+                <a16:creationId xmlns:a16="http://schemas.microsoft.com/office/drawing/2014/main" id="{71725605-5B89-964D-BE98-28DCF11C4720}"/>
+              </a:ext>
+            </a:extLst>
+          </p:cNvPr>
+          <p:cNvCxnSpPr>
+            <a:stCxn id="8" idx="3"/>
+          </p:cNvCxnSpPr>
+          <p:nvPr/>
+        </p:nvCxnSpPr>
+        <p:spPr>
+          <a:xfrm rot="10800000" flipH="1">
+            <a:off x="3379963" y="2760762"/>
+            <a:ext cx="537600" cy="508200"/>
+          </a:xfrm>
+          <a:prstGeom prst="straightConnector1">
+            <a:avLst/>
+          </a:prstGeom>
+          <a:noFill/>
+          <a:ln w="19050" cap="flat" cmpd="sng">
+            <a:solidFill>
+              <a:srgbClr val="666666"/>
+            </a:solidFill>
+            <a:prstDash val="solid"/>
+            <a:round/>
+            <a:headEnd type="none" w="med" len="med"/>
+            <a:tailEnd type="stealth" w="med" len="med"/>
+          </a:ln>
+        </p:spPr>
+      </p:cxnSp>
+      <p:cxnSp>
+        <p:nvCxnSpPr>
+          <p:cNvPr id="15" name="Google Shape;617;p62">
+            <a:extLst>
+              <a:ext uri="{FF2B5EF4-FFF2-40B4-BE49-F238E27FC236}">
+                <a16:creationId xmlns:a16="http://schemas.microsoft.com/office/drawing/2014/main" id="{78B78BB1-071C-F84F-BD75-676175AD6225}"/>
+              </a:ext>
+            </a:extLst>
+          </p:cNvPr>
+          <p:cNvCxnSpPr>
+            <a:stCxn id="9" idx="3"/>
+          </p:cNvCxnSpPr>
+          <p:nvPr/>
+        </p:nvCxnSpPr>
+        <p:spPr>
+          <a:xfrm>
+            <a:off x="4705313" y="2523347"/>
+            <a:ext cx="312300" cy="0"/>
+          </a:xfrm>
+          <a:prstGeom prst="straightConnector1">
+            <a:avLst/>
+          </a:prstGeom>
+          <a:noFill/>
+          <a:ln w="19050" cap="flat" cmpd="sng">
+            <a:solidFill>
+              <a:srgbClr val="666666"/>
+            </a:solidFill>
+            <a:prstDash val="solid"/>
+            <a:round/>
+            <a:headEnd type="none" w="med" len="med"/>
+            <a:tailEnd type="stealth" w="med" len="med"/>
+          </a:ln>
+        </p:spPr>
+      </p:cxnSp>
+      <p:cxnSp>
+        <p:nvCxnSpPr>
+          <p:cNvPr id="16" name="Google Shape;618;p62">
+            <a:extLst>
+              <a:ext uri="{FF2B5EF4-FFF2-40B4-BE49-F238E27FC236}">
+                <a16:creationId xmlns:a16="http://schemas.microsoft.com/office/drawing/2014/main" id="{41DD5904-F770-0344-816F-126B18F94EE8}"/>
+              </a:ext>
+            </a:extLst>
+          </p:cNvPr>
+          <p:cNvCxnSpPr/>
+          <p:nvPr/>
+        </p:nvCxnSpPr>
+        <p:spPr>
+          <a:xfrm>
+            <a:off x="6110788" y="2523347"/>
+            <a:ext cx="312300" cy="0"/>
+          </a:xfrm>
+          <a:prstGeom prst="straightConnector1">
+            <a:avLst/>
+          </a:prstGeom>
+          <a:noFill/>
+          <a:ln w="19050" cap="flat" cmpd="sng">
+            <a:solidFill>
+              <a:srgbClr val="666666"/>
+            </a:solidFill>
+            <a:prstDash val="solid"/>
+            <a:round/>
+            <a:headEnd type="none" w="med" len="med"/>
+            <a:tailEnd type="stealth" w="med" len="med"/>
+          </a:ln>
+        </p:spPr>
+      </p:cxnSp>
+    </p:spTree>
+    <p:extLst>
+      <p:ext uri="{BB962C8B-B14F-4D97-AF65-F5344CB8AC3E}">
+        <p14:creationId xmlns:p14="http://schemas.microsoft.com/office/powerpoint/2010/main" val="3882687863"/>
       </p:ext>
     </p:extLst>
   </p:cSld>

</xml_diff>

<commit_message>
fixed pod to cluster
</commit_message>
<xml_diff>
--- a/figures.pptx
+++ b/figures.pptx
@@ -319,7 +319,7 @@
       </p15:sldGuideLst>
     </p:ext>
     <p:ext uri="http://customooxmlschemas.google.com/">
-      <go:slidesCustomData xmlns="" xmlns:mc="http://schemas.openxmlformats.org/markup-compatibility/2006" xmlns:mv="urn:schemas-microsoft-com:mac:vml" xmlns:c="http://schemas.openxmlformats.org/drawingml/2006/chart" xmlns:dgm="http://schemas.openxmlformats.org/drawingml/2006/diagram" xmlns:o="urn:schemas-microsoft-com:office:office" xmlns:v="urn:schemas-microsoft-com:vml" xmlns:pvml="urn:schemas-microsoft-com:office:powerpoint" xmlns:com="http://schemas.openxmlformats.org/drawingml/2006/compatibility" xmlns:p14="http://schemas.microsoft.com/office/powerpoint/2010/main" xmlns:p15="http://schemas.microsoft.com/office/powerpoint/2012/main" xmlns:go="http://customooxmlschemas.google.com/" r:id="rId29" roundtripDataSignature="AMtx7mjYSJr9dBhpBi3R8tFsPF3I3gzuVA=="/>
+      <go:slidesCustomData xmlns:go="http://customooxmlschemas.google.com/" xmlns:p15="http://schemas.microsoft.com/office/powerpoint/2012/main" xmlns:p14="http://schemas.microsoft.com/office/powerpoint/2010/main" xmlns:com="http://schemas.openxmlformats.org/drawingml/2006/compatibility" xmlns:pvml="urn:schemas-microsoft-com:office:powerpoint" xmlns:v="urn:schemas-microsoft-com:vml" xmlns:o="urn:schemas-microsoft-com:office:office" xmlns:dgm="http://schemas.openxmlformats.org/drawingml/2006/diagram" xmlns:c="http://schemas.openxmlformats.org/drawingml/2006/chart" xmlns:mv="urn:schemas-microsoft-com:mac:vml" xmlns:mc="http://schemas.openxmlformats.org/markup-compatibility/2006" xmlns="" r:id="rId29" roundtripDataSignature="AMtx7mjYSJr9dBhpBi3R8tFsPF3I3gzuVA=="/>
     </p:ext>
   </p:extLst>
 </p:presentation>
@@ -3077,7 +3077,7 @@
           <a:p>
             <a:fld id="{BF4F8DC3-0006-B147-AA6D-FF436E850004}" type="datetimeFigureOut">
               <a:rPr lang="en-US" smtClean="0"/>
-              <a:t>10/12/21</a:t>
+              <a:t>1/31/22</a:t>
             </a:fld>
             <a:endParaRPr lang="en-US"/>
           </a:p>
@@ -7148,7 +7148,24 @@
                 <a:latin typeface="Calibri" panose="020F0502020204030204" pitchFamily="34" charset="0"/>
                 <a:cs typeface="Calibri" panose="020F0502020204030204" pitchFamily="34" charset="0"/>
               </a:rPr>
-              <a:t> PODs</a:t>
+              <a:t> </a:t>
+            </a:r>
+            <a:r>
+              <a:rPr lang="en-US" sz="1200" dirty="0">
+                <a:latin typeface="Calibri" panose="020F0502020204030204" pitchFamily="34" charset="0"/>
+                <a:cs typeface="Calibri" panose="020F0502020204030204" pitchFamily="34" charset="0"/>
+              </a:rPr>
+              <a:t>Cluster</a:t>
+            </a:r>
+            <a:r>
+              <a:rPr lang="en-US" sz="1200" dirty="0">
+                <a:solidFill>
+                  <a:srgbClr val="000000"/>
+                </a:solidFill>
+                <a:latin typeface="Calibri" panose="020F0502020204030204" pitchFamily="34" charset="0"/>
+                <a:cs typeface="Calibri" panose="020F0502020204030204" pitchFamily="34" charset="0"/>
+              </a:rPr>
+              <a:t>s</a:t>
             </a:r>
             <a:endParaRPr sz="1200" dirty="0">
               <a:solidFill>
@@ -7984,7 +8001,7 @@
                 <a:latin typeface="Calibri" panose="020F0502020204030204" pitchFamily="34" charset="0"/>
                 <a:cs typeface="Calibri" panose="020F0502020204030204" pitchFamily="34" charset="0"/>
               </a:rPr>
-              <a:t>PODs</a:t>
+              <a:t>Cluster</a:t>
             </a:r>
             <a:endParaRPr sz="1200" dirty="0">
               <a:solidFill>
@@ -8983,8 +9000,8 @@
         </p:nvSpPr>
         <p:spPr>
           <a:xfrm>
-            <a:off x="7916041" y="1659024"/>
-            <a:ext cx="1023037" cy="307777"/>
+            <a:off x="7871216" y="1650059"/>
+            <a:ext cx="1114408" cy="276999"/>
           </a:xfrm>
           <a:prstGeom prst="rect">
             <a:avLst/>
@@ -9002,14 +9019,7 @@
                 <a:latin typeface="Calibri" panose="020F0502020204030204" pitchFamily="34" charset="0"/>
                 <a:cs typeface="Calibri" panose="020F0502020204030204" pitchFamily="34" charset="0"/>
               </a:rPr>
-              <a:t>Staging POD</a:t>
-            </a:r>
-            <a:r>
-              <a:rPr lang="en-US" dirty="0">
-                <a:latin typeface="Calibri" panose="020F0502020204030204" pitchFamily="34" charset="0"/>
-                <a:cs typeface="Calibri" panose="020F0502020204030204" pitchFamily="34" charset="0"/>
-              </a:rPr>
-              <a:t>s</a:t>
+              <a:t>Staging Cluster</a:t>
             </a:r>
           </a:p>
         </p:txBody>

</xml_diff>

<commit_message>
elaborate on feature lifetime
</commit_message>
<xml_diff>
--- a/figures.pptx
+++ b/figures.pptx
@@ -320,7 +320,7 @@
       </p15:sldGuideLst>
     </p:ext>
     <p:ext uri="http://customooxmlschemas.google.com/">
-      <go:slidesCustomData xmlns="" xmlns:mc="http://schemas.openxmlformats.org/markup-compatibility/2006" xmlns:mv="urn:schemas-microsoft-com:mac:vml" xmlns:c="http://schemas.openxmlformats.org/drawingml/2006/chart" xmlns:dgm="http://schemas.openxmlformats.org/drawingml/2006/diagram" xmlns:o="urn:schemas-microsoft-com:office:office" xmlns:v="urn:schemas-microsoft-com:vml" xmlns:pvml="urn:schemas-microsoft-com:office:powerpoint" xmlns:com="http://schemas.openxmlformats.org/drawingml/2006/compatibility" xmlns:p14="http://schemas.microsoft.com/office/powerpoint/2010/main" xmlns:p15="http://schemas.microsoft.com/office/powerpoint/2012/main" xmlns:go="http://customooxmlschemas.google.com/" r:id="rId29" roundtripDataSignature="AMtx7mjYSJr9dBhpBi3R8tFsPF3I3gzuVA=="/>
+      <go:slidesCustomData xmlns:go="http://customooxmlschemas.google.com/" xmlns:p15="http://schemas.microsoft.com/office/powerpoint/2012/main" xmlns:p14="http://schemas.microsoft.com/office/powerpoint/2010/main" xmlns:com="http://schemas.openxmlformats.org/drawingml/2006/compatibility" xmlns:pvml="urn:schemas-microsoft-com:office:powerpoint" xmlns:v="urn:schemas-microsoft-com:vml" xmlns:o="urn:schemas-microsoft-com:office:office" xmlns:dgm="http://schemas.openxmlformats.org/drawingml/2006/diagram" xmlns:c="http://schemas.openxmlformats.org/drawingml/2006/chart" xmlns:mv="urn:schemas-microsoft-com:mac:vml" xmlns:mc="http://schemas.openxmlformats.org/markup-compatibility/2006" xmlns="" r:id="rId29" roundtripDataSignature="AMtx7mjYSJr9dBhpBi3R8tFsPF3I3gzuVA=="/>
     </p:ext>
   </p:extLst>
 </p:presentation>
@@ -3078,7 +3078,7 @@
           <a:p>
             <a:fld id="{BF4F8DC3-0006-B147-AA6D-FF436E850004}" type="datetimeFigureOut">
               <a:rPr lang="en-US" smtClean="0"/>
-              <a:t>2/3/22</a:t>
+              <a:t>2/7/22</a:t>
             </a:fld>
             <a:endParaRPr lang="en-US"/>
           </a:p>
@@ -25844,8 +25844,8 @@
         </p:nvSpPr>
         <p:spPr>
           <a:xfrm>
-            <a:off x="7252339" y="3944471"/>
-            <a:ext cx="546945" cy="307777"/>
+            <a:off x="6412366" y="3944471"/>
+            <a:ext cx="1386918" cy="307777"/>
           </a:xfrm>
           <a:prstGeom prst="rect">
             <a:avLst/>
@@ -25858,12 +25858,13 @@
           </a:bodyPr>
           <a:lstStyle/>
           <a:p>
+            <a:pPr algn="r"/>
             <a:r>
               <a:rPr lang="en-US" dirty="0">
                 <a:latin typeface="Calibri" panose="020F0502020204030204" pitchFamily="34" charset="0"/>
                 <a:cs typeface="Calibri" panose="020F0502020204030204" pitchFamily="34" charset="0"/>
               </a:rPr>
-              <a:t>Time</a:t>
+              <a:t>Feature Lifetime</a:t>
             </a:r>
           </a:p>
         </p:txBody>
@@ -25964,8 +25965,8 @@
         </p:nvSpPr>
         <p:spPr>
           <a:xfrm>
-            <a:off x="1129553" y="1102656"/>
-            <a:ext cx="1175322" cy="307777"/>
+            <a:off x="1048744" y="1102654"/>
+            <a:ext cx="1354858" cy="307777"/>
           </a:xfrm>
           <a:prstGeom prst="rect">
             <a:avLst/>
@@ -25984,7 +25985,7 @@
                 <a:latin typeface="Calibri" panose="020F0502020204030204" pitchFamily="34" charset="0"/>
                 <a:cs typeface="Calibri" panose="020F0502020204030204" pitchFamily="34" charset="0"/>
               </a:rPr>
-              <a:t>Development</a:t>
+              <a:t>In Development</a:t>
             </a:r>
           </a:p>
         </p:txBody>
@@ -26003,8 +26004,8 @@
         </p:nvSpPr>
         <p:spPr>
           <a:xfrm>
-            <a:off x="3572793" y="1091570"/>
-            <a:ext cx="1370889" cy="307777"/>
+            <a:off x="3317918" y="1091570"/>
+            <a:ext cx="1880643" cy="307777"/>
           </a:xfrm>
           <a:prstGeom prst="rect">
             <a:avLst/>
@@ -26023,7 +26024,7 @@
                 <a:latin typeface="Calibri" panose="020F0502020204030204" pitchFamily="34" charset="0"/>
                 <a:cs typeface="Calibri" panose="020F0502020204030204" pitchFamily="34" charset="0"/>
               </a:rPr>
-              <a:t>Integrate &amp; Test</a:t>
+              <a:t>Integrated &amp; Evaluated</a:t>
             </a:r>
           </a:p>
         </p:txBody>
@@ -26042,8 +26043,8 @@
         </p:nvSpPr>
         <p:spPr>
           <a:xfrm>
-            <a:off x="6196008" y="1102654"/>
-            <a:ext cx="1494320" cy="307777"/>
+            <a:off x="6160742" y="1102654"/>
+            <a:ext cx="1564852" cy="307777"/>
           </a:xfrm>
           <a:prstGeom prst="rect">
             <a:avLst/>
@@ -26058,11 +26059,18 @@
           <a:p>
             <a:pPr algn="ctr"/>
             <a:r>
+              <a:rPr lang="en-US">
+                <a:latin typeface="Calibri" panose="020F0502020204030204" pitchFamily="34" charset="0"/>
+                <a:cs typeface="Calibri" panose="020F0502020204030204" pitchFamily="34" charset="0"/>
+              </a:rPr>
+              <a:t>Runs </a:t>
+            </a:r>
+            <a:r>
               <a:rPr lang="en-US" dirty="0">
                 <a:latin typeface="Calibri" panose="020F0502020204030204" pitchFamily="34" charset="0"/>
                 <a:cs typeface="Calibri" panose="020F0502020204030204" pitchFamily="34" charset="0"/>
               </a:rPr>
-              <a:t>Run in Production</a:t>
+              <a:t>in Production</a:t>
             </a:r>
           </a:p>
         </p:txBody>

</xml_diff>